<commit_message>
new version of system sketch
</commit_message>
<xml_diff>
--- a/paper/system sketch.pptx
+++ b/paper/system sketch.pptx
@@ -3103,7 +3103,7 @@
         </p:nvSpPr>
         <p:spPr>
           <a:xfrm>
-            <a:off x="5278409" y="2877767"/>
+            <a:off x="5205974" y="2950202"/>
             <a:ext cx="384520" cy="908769"/>
           </a:xfrm>
           <a:prstGeom prst="cube">
@@ -3111,6 +3111,27 @@
               <a:gd name="adj" fmla="val 70450"/>
             </a:avLst>
           </a:prstGeom>
+          <a:gradFill flip="none" rotWithShape="1">
+            <a:gsLst>
+              <a:gs pos="0">
+                <a:schemeClr val="bg2">
+                  <a:lumMod val="50000"/>
+                </a:schemeClr>
+              </a:gs>
+              <a:gs pos="100000">
+                <a:srgbClr val="FFFFFF"/>
+              </a:gs>
+            </a:gsLst>
+            <a:lin ang="16200000" scaled="0"/>
+            <a:tileRect/>
+          </a:gradFill>
+          <a:ln>
+            <a:solidFill>
+              <a:schemeClr val="bg2">
+                <a:lumMod val="50000"/>
+              </a:schemeClr>
+            </a:solidFill>
+          </a:ln>
         </p:spPr>
         <p:style>
           <a:lnRef idx="1">
@@ -3143,7 +3164,7 @@
         </p:nvSpPr>
         <p:spPr>
           <a:xfrm>
-            <a:off x="3135746" y="2877767"/>
+            <a:off x="3130917" y="2974347"/>
             <a:ext cx="616641" cy="908769"/>
           </a:xfrm>
           <a:prstGeom prst="cube">
@@ -3151,6 +3172,27 @@
               <a:gd name="adj" fmla="val 43282"/>
             </a:avLst>
           </a:prstGeom>
+          <a:gradFill flip="none" rotWithShape="1">
+            <a:gsLst>
+              <a:gs pos="0">
+                <a:schemeClr val="bg2">
+                  <a:lumMod val="50000"/>
+                </a:schemeClr>
+              </a:gs>
+              <a:gs pos="100000">
+                <a:srgbClr val="FFFFFF"/>
+              </a:gs>
+            </a:gsLst>
+            <a:lin ang="16200000" scaled="0"/>
+            <a:tileRect/>
+          </a:gradFill>
+          <a:ln>
+            <a:solidFill>
+              <a:schemeClr val="bg2">
+                <a:lumMod val="50000"/>
+              </a:schemeClr>
+            </a:solidFill>
+          </a:ln>
         </p:spPr>
         <p:style>
           <a:lnRef idx="1">
@@ -3183,7 +3225,7 @@
         </p:nvSpPr>
         <p:spPr>
           <a:xfrm>
-            <a:off x="2137546" y="2887425"/>
+            <a:off x="2084429" y="3148181"/>
             <a:ext cx="256263" cy="899111"/>
           </a:xfrm>
           <a:prstGeom prst="cube">
@@ -3191,6 +3233,27 @@
               <a:gd name="adj" fmla="val 100000"/>
             </a:avLst>
           </a:prstGeom>
+          <a:gradFill flip="none" rotWithShape="1">
+            <a:gsLst>
+              <a:gs pos="0">
+                <a:schemeClr val="bg2">
+                  <a:lumMod val="50000"/>
+                </a:schemeClr>
+              </a:gs>
+              <a:gs pos="100000">
+                <a:srgbClr val="FFFFFF"/>
+              </a:gs>
+            </a:gsLst>
+            <a:lin ang="16200000" scaled="0"/>
+            <a:tileRect/>
+          </a:gradFill>
+          <a:ln>
+            <a:solidFill>
+              <a:schemeClr val="bg2">
+                <a:lumMod val="50000"/>
+              </a:schemeClr>
+            </a:solidFill>
+          </a:ln>
         </p:spPr>
         <p:style>
           <a:lnRef idx="1">
@@ -3223,14 +3286,35 @@
         </p:nvSpPr>
         <p:spPr>
           <a:xfrm>
-            <a:off x="3135746" y="3380109"/>
-            <a:ext cx="418276" cy="416085"/>
+            <a:off x="4514965" y="3017798"/>
+            <a:ext cx="418276" cy="284897"/>
           </a:xfrm>
           <a:prstGeom prst="cube">
             <a:avLst>
               <a:gd name="adj" fmla="val 23034"/>
             </a:avLst>
           </a:prstGeom>
+          <a:gradFill flip="none" rotWithShape="1">
+            <a:gsLst>
+              <a:gs pos="0">
+                <a:schemeClr val="bg2">
+                  <a:lumMod val="50000"/>
+                </a:schemeClr>
+              </a:gs>
+              <a:gs pos="100000">
+                <a:srgbClr val="FFFFFF"/>
+              </a:gs>
+            </a:gsLst>
+            <a:lin ang="16200000" scaled="0"/>
+            <a:tileRect/>
+          </a:gradFill>
+          <a:ln>
+            <a:solidFill>
+              <a:schemeClr val="bg2">
+                <a:lumMod val="50000"/>
+              </a:schemeClr>
+            </a:solidFill>
+          </a:ln>
         </p:spPr>
         <p:style>
           <a:lnRef idx="1">
@@ -3255,6 +3339,1064 @@
           </a:p>
         </p:txBody>
       </p:sp>
+      <p:sp>
+        <p:nvSpPr>
+          <p:cNvPr id="8" name="Cube 7"/>
+          <p:cNvSpPr/>
+          <p:nvPr/>
+        </p:nvSpPr>
+        <p:spPr>
+          <a:xfrm>
+            <a:off x="2408420" y="2832193"/>
+            <a:ext cx="256263" cy="899111"/>
+          </a:xfrm>
+          <a:prstGeom prst="cube">
+            <a:avLst>
+              <a:gd name="adj" fmla="val 100000"/>
+            </a:avLst>
+          </a:prstGeom>
+          <a:gradFill flip="none" rotWithShape="1">
+            <a:gsLst>
+              <a:gs pos="0">
+                <a:schemeClr val="bg2">
+                  <a:lumMod val="50000"/>
+                </a:schemeClr>
+              </a:gs>
+              <a:gs pos="100000">
+                <a:srgbClr val="FFFFFF"/>
+              </a:gs>
+            </a:gsLst>
+            <a:lin ang="16200000" scaled="0"/>
+            <a:tileRect/>
+          </a:gradFill>
+          <a:ln>
+            <a:solidFill>
+              <a:schemeClr val="bg2">
+                <a:lumMod val="50000"/>
+              </a:schemeClr>
+            </a:solidFill>
+          </a:ln>
+        </p:spPr>
+        <p:style>
+          <a:lnRef idx="1">
+            <a:schemeClr val="accent1"/>
+          </a:lnRef>
+          <a:fillRef idx="3">
+            <a:schemeClr val="accent1"/>
+          </a:fillRef>
+          <a:effectRef idx="2">
+            <a:schemeClr val="accent1"/>
+          </a:effectRef>
+          <a:fontRef idx="minor">
+            <a:schemeClr val="lt1"/>
+          </a:fontRef>
+        </p:style>
+        <p:txBody>
+          <a:bodyPr rtlCol="0" anchor="ctr"/>
+          <a:lstStyle/>
+          <a:p>
+            <a:pPr algn="ctr"/>
+            <a:endParaRPr lang="en-US"/>
+          </a:p>
+        </p:txBody>
+      </p:sp>
+      <p:sp>
+        <p:nvSpPr>
+          <p:cNvPr id="9" name="Cube 8"/>
+          <p:cNvSpPr/>
+          <p:nvPr/>
+        </p:nvSpPr>
+        <p:spPr>
+          <a:xfrm>
+            <a:off x="3946690" y="3513999"/>
+            <a:ext cx="256263" cy="899111"/>
+          </a:xfrm>
+          <a:prstGeom prst="cube">
+            <a:avLst>
+              <a:gd name="adj" fmla="val 100000"/>
+            </a:avLst>
+          </a:prstGeom>
+          <a:gradFill flip="none" rotWithShape="1">
+            <a:gsLst>
+              <a:gs pos="0">
+                <a:schemeClr val="bg2">
+                  <a:lumMod val="50000"/>
+                </a:schemeClr>
+              </a:gs>
+              <a:gs pos="100000">
+                <a:srgbClr val="FFFFFF"/>
+              </a:gs>
+            </a:gsLst>
+            <a:lin ang="16200000" scaled="0"/>
+            <a:tileRect/>
+          </a:gradFill>
+          <a:ln>
+            <a:solidFill>
+              <a:schemeClr val="bg2">
+                <a:lumMod val="50000"/>
+              </a:schemeClr>
+            </a:solidFill>
+          </a:ln>
+        </p:spPr>
+        <p:style>
+          <a:lnRef idx="1">
+            <a:schemeClr val="accent1"/>
+          </a:lnRef>
+          <a:fillRef idx="3">
+            <a:schemeClr val="accent1"/>
+          </a:fillRef>
+          <a:effectRef idx="2">
+            <a:schemeClr val="accent1"/>
+          </a:effectRef>
+          <a:fontRef idx="minor">
+            <a:schemeClr val="lt1"/>
+          </a:fontRef>
+        </p:style>
+        <p:txBody>
+          <a:bodyPr rtlCol="0" anchor="ctr"/>
+          <a:lstStyle/>
+          <a:p>
+            <a:pPr algn="ctr"/>
+            <a:endParaRPr lang="en-US"/>
+          </a:p>
+        </p:txBody>
+      </p:sp>
+      <p:sp>
+        <p:nvSpPr>
+          <p:cNvPr id="10" name="Cube 9"/>
+          <p:cNvSpPr/>
+          <p:nvPr/>
+        </p:nvSpPr>
+        <p:spPr>
+          <a:xfrm>
+            <a:off x="6069252" y="2950202"/>
+            <a:ext cx="256263" cy="899111"/>
+          </a:xfrm>
+          <a:prstGeom prst="cube">
+            <a:avLst>
+              <a:gd name="adj" fmla="val 100000"/>
+            </a:avLst>
+          </a:prstGeom>
+          <a:gradFill flip="none" rotWithShape="1">
+            <a:gsLst>
+              <a:gs pos="0">
+                <a:schemeClr val="bg2">
+                  <a:lumMod val="50000"/>
+                </a:schemeClr>
+              </a:gs>
+              <a:gs pos="100000">
+                <a:srgbClr val="FFFFFF"/>
+              </a:gs>
+            </a:gsLst>
+            <a:lin ang="16200000" scaled="0"/>
+            <a:tileRect/>
+          </a:gradFill>
+          <a:ln>
+            <a:solidFill>
+              <a:schemeClr val="bg2">
+                <a:lumMod val="50000"/>
+              </a:schemeClr>
+            </a:solidFill>
+          </a:ln>
+        </p:spPr>
+        <p:style>
+          <a:lnRef idx="1">
+            <a:schemeClr val="accent1"/>
+          </a:lnRef>
+          <a:fillRef idx="3">
+            <a:schemeClr val="accent1"/>
+          </a:fillRef>
+          <a:effectRef idx="2">
+            <a:schemeClr val="accent1"/>
+          </a:effectRef>
+          <a:fontRef idx="minor">
+            <a:schemeClr val="lt1"/>
+          </a:fontRef>
+        </p:style>
+        <p:txBody>
+          <a:bodyPr rtlCol="0" anchor="ctr"/>
+          <a:lstStyle/>
+          <a:p>
+            <a:pPr algn="ctr"/>
+            <a:endParaRPr lang="en-US"/>
+          </a:p>
+        </p:txBody>
+      </p:sp>
+      <p:sp>
+        <p:nvSpPr>
+          <p:cNvPr id="11" name="Cube 10"/>
+          <p:cNvSpPr/>
+          <p:nvPr/>
+        </p:nvSpPr>
+        <p:spPr>
+          <a:xfrm>
+            <a:off x="6870845" y="2950202"/>
+            <a:ext cx="256263" cy="899111"/>
+          </a:xfrm>
+          <a:prstGeom prst="cube">
+            <a:avLst>
+              <a:gd name="adj" fmla="val 100000"/>
+            </a:avLst>
+          </a:prstGeom>
+          <a:gradFill flip="none" rotWithShape="1">
+            <a:gsLst>
+              <a:gs pos="0">
+                <a:schemeClr val="bg2">
+                  <a:lumMod val="50000"/>
+                </a:schemeClr>
+              </a:gs>
+              <a:gs pos="100000">
+                <a:srgbClr val="FFFFFF"/>
+              </a:gs>
+            </a:gsLst>
+            <a:lin ang="16200000" scaled="0"/>
+            <a:tileRect/>
+          </a:gradFill>
+          <a:ln>
+            <a:solidFill>
+              <a:schemeClr val="bg2">
+                <a:lumMod val="50000"/>
+              </a:schemeClr>
+            </a:solidFill>
+          </a:ln>
+        </p:spPr>
+        <p:style>
+          <a:lnRef idx="1">
+            <a:schemeClr val="accent1"/>
+          </a:lnRef>
+          <a:fillRef idx="3">
+            <a:schemeClr val="accent1"/>
+          </a:fillRef>
+          <a:effectRef idx="2">
+            <a:schemeClr val="accent1"/>
+          </a:effectRef>
+          <a:fontRef idx="minor">
+            <a:schemeClr val="lt1"/>
+          </a:fontRef>
+        </p:style>
+        <p:txBody>
+          <a:bodyPr rtlCol="0" anchor="ctr"/>
+          <a:lstStyle/>
+          <a:p>
+            <a:pPr algn="ctr"/>
+            <a:endParaRPr lang="en-US"/>
+          </a:p>
+        </p:txBody>
+      </p:sp>
+      <p:sp>
+        <p:nvSpPr>
+          <p:cNvPr id="2" name="TextBox 1"/>
+          <p:cNvSpPr txBox="1"/>
+          <p:nvPr/>
+        </p:nvSpPr>
+        <p:spPr>
+          <a:xfrm>
+            <a:off x="1729848" y="4004744"/>
+            <a:ext cx="1308610" cy="461665"/>
+          </a:xfrm>
+          <a:prstGeom prst="rect">
+            <a:avLst/>
+          </a:prstGeom>
+          <a:noFill/>
+        </p:spPr>
+        <p:txBody>
+          <a:bodyPr wrap="square" rtlCol="0">
+            <a:spAutoFit/>
+          </a:bodyPr>
+          <a:lstStyle/>
+          <a:p>
+            <a:pPr algn="ctr"/>
+            <a:r>
+              <a:rPr lang="en-US" sz="1200" dirty="0" smtClean="0"/>
+              <a:t>Stereo Luminance </a:t>
+            </a:r>
+            <a:r>
+              <a:rPr lang="en-US" sz="1200" dirty="0"/>
+              <a:t>I</a:t>
+            </a:r>
+            <a:r>
+              <a:rPr lang="en-US" sz="1200" dirty="0" smtClean="0"/>
+              <a:t>mage </a:t>
+            </a:r>
+            <a:r>
+              <a:rPr lang="en-US" sz="1200" dirty="0"/>
+              <a:t>P</a:t>
+            </a:r>
+            <a:r>
+              <a:rPr lang="en-US" sz="1200" dirty="0" smtClean="0"/>
+              <a:t>air </a:t>
+            </a:r>
+            <a:r>
+              <a:rPr lang="en-US" sz="1200" i="1" dirty="0" smtClean="0"/>
+              <a:t>k</a:t>
+            </a:r>
+            <a:endParaRPr lang="en-US" sz="1200" i="1" dirty="0"/>
+          </a:p>
+        </p:txBody>
+      </p:sp>
+      <p:sp>
+        <p:nvSpPr>
+          <p:cNvPr id="3" name="Arc 2"/>
+          <p:cNvSpPr/>
+          <p:nvPr/>
+        </p:nvSpPr>
+        <p:spPr>
+          <a:xfrm>
+            <a:off x="3159891" y="2704085"/>
+            <a:ext cx="572798" cy="574465"/>
+          </a:xfrm>
+          <a:prstGeom prst="arc">
+            <a:avLst>
+              <a:gd name="adj1" fmla="val 9454884"/>
+              <a:gd name="adj2" fmla="val 2663446"/>
+            </a:avLst>
+          </a:prstGeom>
+          <a:ln w="19050">
+            <a:solidFill>
+              <a:schemeClr val="tx1"/>
+            </a:solidFill>
+            <a:headEnd type="triangle" w="lg" len="med"/>
+            <a:tailEnd type="none"/>
+          </a:ln>
+          <a:effectLst/>
+        </p:spPr>
+        <p:style>
+          <a:lnRef idx="2">
+            <a:schemeClr val="accent1"/>
+          </a:lnRef>
+          <a:fillRef idx="0">
+            <a:schemeClr val="accent1"/>
+          </a:fillRef>
+          <a:effectRef idx="1">
+            <a:schemeClr val="accent1"/>
+          </a:effectRef>
+          <a:fontRef idx="minor">
+            <a:schemeClr val="tx1"/>
+          </a:fontRef>
+        </p:style>
+        <p:txBody>
+          <a:bodyPr rtlCol="0" anchor="ctr"/>
+          <a:lstStyle/>
+          <a:p>
+            <a:pPr algn="ctr"/>
+            <a:endParaRPr lang="en-US"/>
+          </a:p>
+        </p:txBody>
+      </p:sp>
+      <p:sp>
+        <p:nvSpPr>
+          <p:cNvPr id="14" name="TextBox 13"/>
+          <p:cNvSpPr txBox="1"/>
+          <p:nvPr/>
+        </p:nvSpPr>
+        <p:spPr>
+          <a:xfrm>
+            <a:off x="3023971" y="2278995"/>
+            <a:ext cx="813043" cy="461665"/>
+          </a:xfrm>
+          <a:prstGeom prst="rect">
+            <a:avLst/>
+          </a:prstGeom>
+          <a:noFill/>
+        </p:spPr>
+        <p:txBody>
+          <a:bodyPr wrap="none" rtlCol="0">
+            <a:spAutoFit/>
+          </a:bodyPr>
+          <a:lstStyle/>
+          <a:p>
+            <a:pPr algn="ctr"/>
+            <a:r>
+              <a:rPr lang="en-US" sz="1200" dirty="0" smtClean="0"/>
+              <a:t>Coarse BP</a:t>
+            </a:r>
+          </a:p>
+          <a:p>
+            <a:pPr algn="ctr"/>
+            <a:r>
+              <a:rPr lang="en-US" sz="1200" dirty="0" smtClean="0"/>
+              <a:t>Scales</a:t>
+            </a:r>
+            <a:endParaRPr lang="en-US" sz="1200" dirty="0"/>
+          </a:p>
+        </p:txBody>
+      </p:sp>
+      <p:sp>
+        <p:nvSpPr>
+          <p:cNvPr id="15" name="Arc 14"/>
+          <p:cNvSpPr/>
+          <p:nvPr/>
+        </p:nvSpPr>
+        <p:spPr>
+          <a:xfrm>
+            <a:off x="4451896" y="2705844"/>
+            <a:ext cx="536290" cy="538748"/>
+          </a:xfrm>
+          <a:prstGeom prst="arc">
+            <a:avLst>
+              <a:gd name="adj1" fmla="val 9039360"/>
+              <a:gd name="adj2" fmla="val 2460772"/>
+            </a:avLst>
+          </a:prstGeom>
+          <a:ln w="19050">
+            <a:solidFill>
+              <a:schemeClr val="tx1"/>
+            </a:solidFill>
+            <a:headEnd type="triangle" w="lg" len="med"/>
+            <a:tailEnd type="none"/>
+          </a:ln>
+          <a:effectLst/>
+        </p:spPr>
+        <p:style>
+          <a:lnRef idx="2">
+            <a:schemeClr val="accent1"/>
+          </a:lnRef>
+          <a:fillRef idx="0">
+            <a:schemeClr val="accent1"/>
+          </a:fillRef>
+          <a:effectRef idx="1">
+            <a:schemeClr val="accent1"/>
+          </a:effectRef>
+          <a:fontRef idx="minor">
+            <a:schemeClr val="tx1"/>
+          </a:fontRef>
+        </p:style>
+        <p:txBody>
+          <a:bodyPr rtlCol="0" anchor="ctr"/>
+          <a:lstStyle/>
+          <a:p>
+            <a:pPr algn="ctr"/>
+            <a:endParaRPr lang="en-US"/>
+          </a:p>
+        </p:txBody>
+      </p:sp>
+      <p:sp>
+        <p:nvSpPr>
+          <p:cNvPr id="16" name="TextBox 15"/>
+          <p:cNvSpPr txBox="1"/>
+          <p:nvPr/>
+        </p:nvSpPr>
+        <p:spPr>
+          <a:xfrm>
+            <a:off x="4285881" y="2283824"/>
+            <a:ext cx="837511" cy="461665"/>
+          </a:xfrm>
+          <a:prstGeom prst="rect">
+            <a:avLst/>
+          </a:prstGeom>
+          <a:noFill/>
+        </p:spPr>
+        <p:txBody>
+          <a:bodyPr wrap="square" rtlCol="0">
+            <a:spAutoFit/>
+          </a:bodyPr>
+          <a:lstStyle/>
+          <a:p>
+            <a:pPr algn="ctr"/>
+            <a:r>
+              <a:rPr lang="en-US" sz="1200" dirty="0" smtClean="0"/>
+              <a:t>Fine BP Scales</a:t>
+            </a:r>
+            <a:endParaRPr lang="en-US" sz="1200" dirty="0"/>
+          </a:p>
+        </p:txBody>
+      </p:sp>
+      <p:sp>
+        <p:nvSpPr>
+          <p:cNvPr id="17" name="TextBox 16"/>
+          <p:cNvSpPr txBox="1"/>
+          <p:nvPr/>
+        </p:nvSpPr>
+        <p:spPr>
+          <a:xfrm>
+            <a:off x="3440843" y="4377022"/>
+            <a:ext cx="1255787" cy="461665"/>
+          </a:xfrm>
+          <a:prstGeom prst="rect">
+            <a:avLst/>
+          </a:prstGeom>
+          <a:noFill/>
+        </p:spPr>
+        <p:txBody>
+          <a:bodyPr wrap="square" rtlCol="0">
+            <a:spAutoFit/>
+          </a:bodyPr>
+          <a:lstStyle/>
+          <a:p>
+            <a:pPr algn="ctr"/>
+            <a:r>
+              <a:rPr lang="en-US" sz="1200" dirty="0" smtClean="0"/>
+              <a:t>Coarse Disparity Image</a:t>
+            </a:r>
+            <a:endParaRPr lang="en-US" sz="1200" dirty="0"/>
+          </a:p>
+        </p:txBody>
+      </p:sp>
+      <p:sp>
+        <p:nvSpPr>
+          <p:cNvPr id="18" name="TextBox 17"/>
+          <p:cNvSpPr txBox="1"/>
+          <p:nvPr/>
+        </p:nvSpPr>
+        <p:spPr>
+          <a:xfrm>
+            <a:off x="5075695" y="3835479"/>
+            <a:ext cx="656133" cy="461665"/>
+          </a:xfrm>
+          <a:prstGeom prst="rect">
+            <a:avLst/>
+          </a:prstGeom>
+          <a:noFill/>
+        </p:spPr>
+        <p:txBody>
+          <a:bodyPr wrap="square" rtlCol="0">
+            <a:spAutoFit/>
+          </a:bodyPr>
+          <a:lstStyle/>
+          <a:p>
+            <a:pPr algn="ctr"/>
+            <a:r>
+              <a:rPr lang="en-US" sz="1200" dirty="0" smtClean="0"/>
+              <a:t>Frames </a:t>
+            </a:r>
+            <a:r>
+              <a:rPr lang="en-US" sz="1200" i="1" dirty="0" smtClean="0"/>
+              <a:t>k</a:t>
+            </a:r>
+            <a:r>
+              <a:rPr lang="en-US" sz="1200" dirty="0" smtClean="0"/>
+              <a:t> ... </a:t>
+            </a:r>
+            <a:r>
+              <a:rPr lang="en-US" sz="1200" i="1" dirty="0" smtClean="0"/>
+              <a:t>k</a:t>
+            </a:r>
+            <a:r>
+              <a:rPr lang="en-US" sz="1200" dirty="0" smtClean="0"/>
+              <a:t>-</a:t>
+            </a:r>
+            <a:r>
+              <a:rPr lang="en-US" sz="1200" i="1" dirty="0" smtClean="0"/>
+              <a:t>n</a:t>
+            </a:r>
+            <a:endParaRPr lang="en-US" sz="1200" i="1" dirty="0"/>
+          </a:p>
+        </p:txBody>
+      </p:sp>
+      <p:sp>
+        <p:nvSpPr>
+          <p:cNvPr id="19" name="TextBox 18"/>
+          <p:cNvSpPr txBox="1"/>
+          <p:nvPr/>
+        </p:nvSpPr>
+        <p:spPr>
+          <a:xfrm>
+            <a:off x="5707684" y="3835640"/>
+            <a:ext cx="955513" cy="461665"/>
+          </a:xfrm>
+          <a:prstGeom prst="rect">
+            <a:avLst/>
+          </a:prstGeom>
+          <a:noFill/>
+        </p:spPr>
+        <p:txBody>
+          <a:bodyPr wrap="square" rtlCol="0">
+            <a:spAutoFit/>
+          </a:bodyPr>
+          <a:lstStyle/>
+          <a:p>
+            <a:pPr algn="ctr"/>
+            <a:r>
+              <a:rPr lang="en-US" sz="1200" dirty="0" smtClean="0"/>
+              <a:t>Uncertainty Cost</a:t>
+            </a:r>
+            <a:endParaRPr lang="en-US" sz="1200" i="1" dirty="0"/>
+          </a:p>
+        </p:txBody>
+      </p:sp>
+      <p:sp>
+        <p:nvSpPr>
+          <p:cNvPr id="20" name="TextBox 19"/>
+          <p:cNvSpPr txBox="1"/>
+          <p:nvPr/>
+        </p:nvSpPr>
+        <p:spPr>
+          <a:xfrm>
+            <a:off x="6507147" y="3839166"/>
+            <a:ext cx="955513" cy="461665"/>
+          </a:xfrm>
+          <a:prstGeom prst="rect">
+            <a:avLst/>
+          </a:prstGeom>
+          <a:noFill/>
+        </p:spPr>
+        <p:txBody>
+          <a:bodyPr wrap="square" rtlCol="0">
+            <a:spAutoFit/>
+          </a:bodyPr>
+          <a:lstStyle/>
+          <a:p>
+            <a:pPr algn="ctr"/>
+            <a:r>
+              <a:rPr lang="en-US" sz="1200" dirty="0" smtClean="0"/>
+              <a:t>Disparity Estimate</a:t>
+            </a:r>
+            <a:endParaRPr lang="en-US" sz="1200" i="1" dirty="0"/>
+          </a:p>
+        </p:txBody>
+      </p:sp>
+      <p:sp>
+        <p:nvSpPr>
+          <p:cNvPr id="21" name="TextBox 20"/>
+          <p:cNvSpPr txBox="1"/>
+          <p:nvPr/>
+        </p:nvSpPr>
+        <p:spPr>
+          <a:xfrm>
+            <a:off x="5181324" y="2280737"/>
+            <a:ext cx="743647" cy="461665"/>
+          </a:xfrm>
+          <a:prstGeom prst="rect">
+            <a:avLst/>
+          </a:prstGeom>
+          <a:noFill/>
+          <a:ln>
+            <a:solidFill>
+              <a:schemeClr val="tx1"/>
+            </a:solidFill>
+          </a:ln>
+        </p:spPr>
+        <p:txBody>
+          <a:bodyPr wrap="square" rtlCol="0">
+            <a:spAutoFit/>
+          </a:bodyPr>
+          <a:lstStyle/>
+          <a:p>
+            <a:pPr algn="ctr"/>
+            <a:r>
+              <a:rPr lang="en-US" sz="1200" dirty="0" smtClean="0"/>
+              <a:t>Cost Function</a:t>
+            </a:r>
+            <a:endParaRPr lang="en-US" sz="1200" dirty="0"/>
+          </a:p>
+        </p:txBody>
+      </p:sp>
+      <p:sp>
+        <p:nvSpPr>
+          <p:cNvPr id="22" name="TextBox 21"/>
+          <p:cNvSpPr txBox="1"/>
+          <p:nvPr/>
+        </p:nvSpPr>
+        <p:spPr>
+          <a:xfrm>
+            <a:off x="6615502" y="2278235"/>
+            <a:ext cx="941623" cy="461665"/>
+          </a:xfrm>
+          <a:prstGeom prst="rect">
+            <a:avLst/>
+          </a:prstGeom>
+          <a:noFill/>
+          <a:ln>
+            <a:solidFill>
+              <a:schemeClr val="tx1"/>
+            </a:solidFill>
+          </a:ln>
+        </p:spPr>
+        <p:txBody>
+          <a:bodyPr wrap="square" rtlCol="0">
+            <a:spAutoFit/>
+          </a:bodyPr>
+          <a:lstStyle/>
+          <a:p>
+            <a:pPr algn="ctr"/>
+            <a:r>
+              <a:rPr lang="en-US" sz="1200" dirty="0" smtClean="0"/>
+              <a:t>Fovea Position </a:t>
+            </a:r>
+            <a:r>
+              <a:rPr lang="en-US" sz="1200" i="1" dirty="0" smtClean="0"/>
+              <a:t>k</a:t>
+            </a:r>
+            <a:r>
+              <a:rPr lang="en-US" sz="1200" dirty="0" smtClean="0"/>
+              <a:t>+1</a:t>
+            </a:r>
+            <a:endParaRPr lang="en-US" sz="1200" dirty="0"/>
+          </a:p>
+        </p:txBody>
+      </p:sp>
+      <p:cxnSp>
+        <p:nvCxnSpPr>
+          <p:cNvPr id="24" name="Straight Arrow Connector 23"/>
+          <p:cNvCxnSpPr/>
+          <p:nvPr/>
+        </p:nvCxnSpPr>
+        <p:spPr>
+          <a:xfrm>
+            <a:off x="2583427" y="3278550"/>
+            <a:ext cx="526631" cy="77415"/>
+          </a:xfrm>
+          <a:prstGeom prst="straightConnector1">
+            <a:avLst/>
+          </a:prstGeom>
+          <a:ln w="19050">
+            <a:solidFill>
+              <a:schemeClr val="tx1"/>
+            </a:solidFill>
+            <a:tailEnd type="triangle"/>
+          </a:ln>
+          <a:effectLst/>
+        </p:spPr>
+        <p:style>
+          <a:lnRef idx="2">
+            <a:schemeClr val="accent1"/>
+          </a:lnRef>
+          <a:fillRef idx="0">
+            <a:schemeClr val="accent1"/>
+          </a:fillRef>
+          <a:effectRef idx="1">
+            <a:schemeClr val="accent1"/>
+          </a:effectRef>
+          <a:fontRef idx="minor">
+            <a:schemeClr val="tx1"/>
+          </a:fontRef>
+        </p:style>
+      </p:cxnSp>
+      <p:cxnSp>
+        <p:nvCxnSpPr>
+          <p:cNvPr id="25" name="Straight Arrow Connector 24"/>
+          <p:cNvCxnSpPr/>
+          <p:nvPr/>
+        </p:nvCxnSpPr>
+        <p:spPr>
+          <a:xfrm flipV="1">
+            <a:off x="2293696" y="3533316"/>
+            <a:ext cx="811533" cy="54428"/>
+          </a:xfrm>
+          <a:prstGeom prst="straightConnector1">
+            <a:avLst/>
+          </a:prstGeom>
+          <a:ln w="19050">
+            <a:solidFill>
+              <a:schemeClr val="tx1"/>
+            </a:solidFill>
+            <a:tailEnd type="triangle"/>
+          </a:ln>
+          <a:effectLst/>
+        </p:spPr>
+        <p:style>
+          <a:lnRef idx="2">
+            <a:schemeClr val="accent1"/>
+          </a:lnRef>
+          <a:fillRef idx="0">
+            <a:schemeClr val="accent1"/>
+          </a:fillRef>
+          <a:effectRef idx="1">
+            <a:schemeClr val="accent1"/>
+          </a:effectRef>
+          <a:fontRef idx="minor">
+            <a:schemeClr val="tx1"/>
+          </a:fontRef>
+        </p:style>
+      </p:cxnSp>
+      <p:cxnSp>
+        <p:nvCxnSpPr>
+          <p:cNvPr id="41" name="Straight Arrow Connector 40"/>
+          <p:cNvCxnSpPr/>
+          <p:nvPr/>
+        </p:nvCxnSpPr>
+        <p:spPr>
+          <a:xfrm>
+            <a:off x="3602254" y="3626071"/>
+            <a:ext cx="320291" cy="222434"/>
+          </a:xfrm>
+          <a:prstGeom prst="straightConnector1">
+            <a:avLst/>
+          </a:prstGeom>
+          <a:ln w="19050">
+            <a:solidFill>
+              <a:schemeClr val="tx1"/>
+            </a:solidFill>
+            <a:tailEnd type="triangle"/>
+          </a:ln>
+          <a:effectLst/>
+        </p:spPr>
+        <p:style>
+          <a:lnRef idx="2">
+            <a:schemeClr val="accent1"/>
+          </a:lnRef>
+          <a:fillRef idx="0">
+            <a:schemeClr val="accent1"/>
+          </a:fillRef>
+          <a:effectRef idx="1">
+            <a:schemeClr val="accent1"/>
+          </a:effectRef>
+          <a:fontRef idx="minor">
+            <a:schemeClr val="tx1"/>
+          </a:fontRef>
+        </p:style>
+      </p:cxnSp>
+      <p:cxnSp>
+        <p:nvCxnSpPr>
+          <p:cNvPr id="43" name="Straight Arrow Connector 42"/>
+          <p:cNvCxnSpPr>
+            <a:endCxn id="7" idx="2"/>
+          </p:cNvCxnSpPr>
+          <p:nvPr/>
+        </p:nvCxnSpPr>
+        <p:spPr>
+          <a:xfrm flipV="1">
+            <a:off x="3640886" y="3193058"/>
+            <a:ext cx="874079" cy="162907"/>
+          </a:xfrm>
+          <a:prstGeom prst="straightConnector1">
+            <a:avLst/>
+          </a:prstGeom>
+          <a:ln w="19050">
+            <a:solidFill>
+              <a:schemeClr val="tx1"/>
+            </a:solidFill>
+            <a:tailEnd type="triangle"/>
+          </a:ln>
+          <a:effectLst/>
+        </p:spPr>
+        <p:style>
+          <a:lnRef idx="2">
+            <a:schemeClr val="accent1"/>
+          </a:lnRef>
+          <a:fillRef idx="0">
+            <a:schemeClr val="accent1"/>
+          </a:fillRef>
+          <a:effectRef idx="1">
+            <a:schemeClr val="accent1"/>
+          </a:effectRef>
+          <a:fontRef idx="minor">
+            <a:schemeClr val="tx1"/>
+          </a:fontRef>
+        </p:style>
+      </p:cxnSp>
+      <p:cxnSp>
+        <p:nvCxnSpPr>
+          <p:cNvPr id="48" name="Straight Arrow Connector 47"/>
+          <p:cNvCxnSpPr/>
+          <p:nvPr/>
+        </p:nvCxnSpPr>
+        <p:spPr>
+          <a:xfrm>
+            <a:off x="5507523" y="3412440"/>
+            <a:ext cx="538173" cy="0"/>
+          </a:xfrm>
+          <a:prstGeom prst="straightConnector1">
+            <a:avLst/>
+          </a:prstGeom>
+          <a:ln w="19050">
+            <a:solidFill>
+              <a:schemeClr val="tx1"/>
+            </a:solidFill>
+            <a:tailEnd type="triangle"/>
+          </a:ln>
+          <a:effectLst/>
+        </p:spPr>
+        <p:style>
+          <a:lnRef idx="2">
+            <a:schemeClr val="accent1"/>
+          </a:lnRef>
+          <a:fillRef idx="0">
+            <a:schemeClr val="accent1"/>
+          </a:fillRef>
+          <a:effectRef idx="1">
+            <a:schemeClr val="accent1"/>
+          </a:effectRef>
+          <a:fontRef idx="minor">
+            <a:schemeClr val="tx1"/>
+          </a:fontRef>
+        </p:style>
+      </p:cxnSp>
+      <p:cxnSp>
+        <p:nvCxnSpPr>
+          <p:cNvPr id="50" name="Straight Arrow Connector 49"/>
+          <p:cNvCxnSpPr/>
+          <p:nvPr/>
+        </p:nvCxnSpPr>
+        <p:spPr>
+          <a:xfrm>
+            <a:off x="6304868" y="3418508"/>
+            <a:ext cx="538173" cy="0"/>
+          </a:xfrm>
+          <a:prstGeom prst="straightConnector1">
+            <a:avLst/>
+          </a:prstGeom>
+          <a:ln w="19050">
+            <a:solidFill>
+              <a:schemeClr val="tx1"/>
+            </a:solidFill>
+            <a:tailEnd type="triangle"/>
+          </a:ln>
+          <a:effectLst/>
+        </p:spPr>
+        <p:style>
+          <a:lnRef idx="2">
+            <a:schemeClr val="accent1"/>
+          </a:lnRef>
+          <a:fillRef idx="0">
+            <a:schemeClr val="accent1"/>
+          </a:fillRef>
+          <a:effectRef idx="1">
+            <a:schemeClr val="accent1"/>
+          </a:effectRef>
+          <a:fontRef idx="minor">
+            <a:schemeClr val="tx1"/>
+          </a:fontRef>
+        </p:style>
+      </p:cxnSp>
+      <p:cxnSp>
+        <p:nvCxnSpPr>
+          <p:cNvPr id="51" name="Straight Arrow Connector 50"/>
+          <p:cNvCxnSpPr/>
+          <p:nvPr/>
+        </p:nvCxnSpPr>
+        <p:spPr>
+          <a:xfrm>
+            <a:off x="5678708" y="2755147"/>
+            <a:ext cx="438834" cy="383528"/>
+          </a:xfrm>
+          <a:prstGeom prst="straightConnector1">
+            <a:avLst/>
+          </a:prstGeom>
+          <a:ln w="19050">
+            <a:solidFill>
+              <a:schemeClr val="tx1"/>
+            </a:solidFill>
+            <a:tailEnd type="triangle"/>
+          </a:ln>
+          <a:effectLst/>
+        </p:spPr>
+        <p:style>
+          <a:lnRef idx="2">
+            <a:schemeClr val="accent1"/>
+          </a:lnRef>
+          <a:fillRef idx="0">
+            <a:schemeClr val="accent1"/>
+          </a:fillRef>
+          <a:effectRef idx="1">
+            <a:schemeClr val="accent1"/>
+          </a:effectRef>
+          <a:fontRef idx="minor">
+            <a:schemeClr val="tx1"/>
+          </a:fontRef>
+        </p:style>
+      </p:cxnSp>
+      <p:cxnSp>
+        <p:nvCxnSpPr>
+          <p:cNvPr id="53" name="Straight Arrow Connector 52"/>
+          <p:cNvCxnSpPr/>
+          <p:nvPr/>
+        </p:nvCxnSpPr>
+        <p:spPr>
+          <a:xfrm flipV="1">
+            <a:off x="6280723" y="2791004"/>
+            <a:ext cx="538173" cy="402054"/>
+          </a:xfrm>
+          <a:prstGeom prst="straightConnector1">
+            <a:avLst/>
+          </a:prstGeom>
+          <a:ln w="19050">
+            <a:solidFill>
+              <a:schemeClr val="tx1"/>
+            </a:solidFill>
+            <a:tailEnd type="triangle"/>
+          </a:ln>
+          <a:effectLst/>
+        </p:spPr>
+        <p:style>
+          <a:lnRef idx="2">
+            <a:schemeClr val="accent1"/>
+          </a:lnRef>
+          <a:fillRef idx="0">
+            <a:schemeClr val="accent1"/>
+          </a:fillRef>
+          <a:effectRef idx="1">
+            <a:schemeClr val="accent1"/>
+          </a:effectRef>
+          <a:fontRef idx="minor">
+            <a:schemeClr val="tx1"/>
+          </a:fontRef>
+        </p:style>
+      </p:cxnSp>
+      <p:cxnSp>
+        <p:nvCxnSpPr>
+          <p:cNvPr id="59" name="Straight Arrow Connector 58"/>
+          <p:cNvCxnSpPr/>
+          <p:nvPr/>
+        </p:nvCxnSpPr>
+        <p:spPr>
+          <a:xfrm>
+            <a:off x="4964041" y="3215618"/>
+            <a:ext cx="217788" cy="111373"/>
+          </a:xfrm>
+          <a:prstGeom prst="straightConnector1">
+            <a:avLst/>
+          </a:prstGeom>
+          <a:ln w="19050">
+            <a:solidFill>
+              <a:schemeClr val="tx1"/>
+            </a:solidFill>
+            <a:tailEnd type="triangle"/>
+          </a:ln>
+          <a:effectLst/>
+        </p:spPr>
+        <p:style>
+          <a:lnRef idx="2">
+            <a:schemeClr val="accent1"/>
+          </a:lnRef>
+          <a:fillRef idx="0">
+            <a:schemeClr val="accent1"/>
+          </a:fillRef>
+          <a:effectRef idx="1">
+            <a:schemeClr val="accent1"/>
+          </a:effectRef>
+          <a:fontRef idx="minor">
+            <a:schemeClr val="tx1"/>
+          </a:fontRef>
+        </p:style>
+      </p:cxnSp>
+      <p:cxnSp>
+        <p:nvCxnSpPr>
+          <p:cNvPr id="61" name="Straight Arrow Connector 60"/>
+          <p:cNvCxnSpPr/>
+          <p:nvPr/>
+        </p:nvCxnSpPr>
+        <p:spPr>
+          <a:xfrm flipV="1">
+            <a:off x="4143670" y="3523658"/>
+            <a:ext cx="1042498" cy="349800"/>
+          </a:xfrm>
+          <a:prstGeom prst="straightConnector1">
+            <a:avLst/>
+          </a:prstGeom>
+          <a:ln w="19050">
+            <a:solidFill>
+              <a:schemeClr val="tx1"/>
+            </a:solidFill>
+            <a:tailEnd type="triangle"/>
+          </a:ln>
+          <a:effectLst/>
+        </p:spPr>
+        <p:style>
+          <a:lnRef idx="2">
+            <a:schemeClr val="accent1"/>
+          </a:lnRef>
+          <a:fillRef idx="0">
+            <a:schemeClr val="accent1"/>
+          </a:fillRef>
+          <a:effectRef idx="1">
+            <a:schemeClr val="accent1"/>
+          </a:effectRef>
+          <a:fontRef idx="minor">
+            <a:schemeClr val="tx1"/>
+          </a:fontRef>
+        </p:style>
+      </p:cxnSp>
     </p:spTree>
     <p:extLst>
       <p:ext uri="{BB962C8B-B14F-4D97-AF65-F5344CB8AC3E}">

</xml_diff>